<commit_message>
Updated Surv_Simul() example to use daily bins for bshazard
</commit_message>
<xml_diff>
--- a/plot_prefix-Hazard-Curve.pptx
+++ b/plot_prefix-Hazard-Curve.pptx
@@ -2359,7 +2359,7 @@
           </p:nvSpPr>
           <p:spPr>
             <a:xfrm>
-              <a:off x="1428330" y="3558862"/>
+              <a:off x="1428330" y="3603574"/>
               <a:ext cx="4260935" cy="0"/>
             </a:xfrm>
             <a:custGeom>
@@ -2402,7 +2402,7 @@
           </p:nvSpPr>
           <p:spPr>
             <a:xfrm>
-              <a:off x="1428330" y="2591916"/>
+              <a:off x="1428330" y="2756416"/>
               <a:ext cx="4260935" cy="0"/>
             </a:xfrm>
             <a:custGeom>
@@ -2445,7 +2445,7 @@
           </p:nvSpPr>
           <p:spPr>
             <a:xfrm>
-              <a:off x="1428330" y="1624970"/>
+              <a:off x="1428330" y="1909257"/>
               <a:ext cx="4260935" cy="0"/>
             </a:xfrm>
             <a:custGeom>
@@ -2483,6 +2483,49 @@
         <p:sp>
           <p:nvSpPr>
             <p:cNvPr id="10" name="pl9"/>
+            <p:cNvSpPr/>
+            <p:nvPr/>
+          </p:nvSpPr>
+          <p:spPr>
+            <a:xfrm>
+              <a:off x="1428330" y="1062099"/>
+              <a:ext cx="4260935" cy="0"/>
+            </a:xfrm>
+            <a:custGeom>
+              <a:avLst/>
+              <a:pathLst>
+                <a:path w="4260935" h="0">
+                  <a:moveTo>
+                    <a:pt x="0" y="0"/>
+                  </a:moveTo>
+                  <a:lnTo>
+                    <a:pt x="4260935" y="0"/>
+                  </a:lnTo>
+                  <a:lnTo>
+                    <a:pt x="4260935" y="0"/>
+                  </a:lnTo>
+                </a:path>
+              </a:pathLst>
+            </a:custGeom>
+            <a:ln w="6775" cap="flat">
+              <a:solidFill>
+                <a:srgbClr val="FFFFFF">
+                  <a:alpha val="100000"/>
+                </a:srgbClr>
+              </a:solidFill>
+              <a:prstDash val="solid"/>
+              <a:round/>
+            </a:ln>
+          </p:spPr>
+          <p:txBody>
+            <a:bodyPr/>
+            <a:lstStyle/>
+            <a:p/>
+          </p:txBody>
+        </p:sp>
+        <p:sp>
+          <p:nvSpPr>
+            <p:cNvPr id="11" name="pl10"/>
             <p:cNvSpPr/>
             <p:nvPr/>
           </p:nvSpPr>
@@ -2525,7 +2568,7 @@
         </p:sp>
         <p:sp>
           <p:nvSpPr>
-            <p:cNvPr id="11" name="pl10"/>
+            <p:cNvPr id="12" name="pl11"/>
             <p:cNvSpPr/>
             <p:nvPr/>
           </p:nvSpPr>
@@ -2568,7 +2611,7 @@
         </p:sp>
         <p:sp>
           <p:nvSpPr>
-            <p:cNvPr id="12" name="pl11"/>
+            <p:cNvPr id="13" name="pl12"/>
             <p:cNvSpPr/>
             <p:nvPr/>
           </p:nvSpPr>
@@ -2611,7 +2654,7 @@
         </p:sp>
         <p:sp>
           <p:nvSpPr>
-            <p:cNvPr id="13" name="pl12"/>
+            <p:cNvPr id="14" name="pl13"/>
             <p:cNvSpPr/>
             <p:nvPr/>
           </p:nvSpPr>
@@ -2654,7 +2697,7 @@
         </p:sp>
         <p:sp>
           <p:nvSpPr>
-            <p:cNvPr id="14" name="pl13"/>
+            <p:cNvPr id="15" name="pl14"/>
             <p:cNvSpPr/>
             <p:nvPr/>
           </p:nvSpPr>
@@ -2697,7 +2740,7 @@
         </p:sp>
         <p:sp>
           <p:nvSpPr>
-            <p:cNvPr id="15" name="pl14"/>
+            <p:cNvPr id="16" name="pl15"/>
             <p:cNvSpPr/>
             <p:nvPr/>
           </p:nvSpPr>
@@ -2740,7 +2783,7 @@
         </p:sp>
         <p:sp>
           <p:nvSpPr>
-            <p:cNvPr id="16" name="pl15"/>
+            <p:cNvPr id="17" name="pl16"/>
             <p:cNvSpPr/>
             <p:nvPr/>
           </p:nvSpPr>
@@ -2783,7 +2826,7 @@
         </p:sp>
         <p:sp>
           <p:nvSpPr>
-            <p:cNvPr id="17" name="pl16"/>
+            <p:cNvPr id="18" name="pl17"/>
             <p:cNvSpPr/>
             <p:nvPr/>
           </p:nvSpPr>
@@ -2826,7 +2869,7 @@
         </p:sp>
         <p:sp>
           <p:nvSpPr>
-            <p:cNvPr id="18" name="pl17"/>
+            <p:cNvPr id="19" name="pl18"/>
             <p:cNvSpPr/>
             <p:nvPr/>
           </p:nvSpPr>
@@ -2869,7 +2912,7 @@
         </p:sp>
         <p:sp>
           <p:nvSpPr>
-            <p:cNvPr id="19" name="pl18"/>
+            <p:cNvPr id="20" name="pl19"/>
             <p:cNvSpPr/>
             <p:nvPr/>
           </p:nvSpPr>
@@ -2912,7 +2955,7 @@
         </p:sp>
         <p:sp>
           <p:nvSpPr>
-            <p:cNvPr id="20" name="pl19"/>
+            <p:cNvPr id="21" name="pl20"/>
             <p:cNvSpPr/>
             <p:nvPr/>
           </p:nvSpPr>
@@ -2955,7 +2998,7 @@
         </p:sp>
         <p:sp>
           <p:nvSpPr>
-            <p:cNvPr id="21" name="pl20"/>
+            <p:cNvPr id="22" name="pl21"/>
             <p:cNvSpPr/>
             <p:nvPr/>
           </p:nvSpPr>
@@ -2998,7 +3041,7 @@
         </p:sp>
         <p:sp>
           <p:nvSpPr>
-            <p:cNvPr id="22" name="pl21"/>
+            <p:cNvPr id="23" name="pl22"/>
             <p:cNvSpPr/>
             <p:nvPr/>
           </p:nvSpPr>
@@ -3041,7 +3084,7 @@
         </p:sp>
         <p:sp>
           <p:nvSpPr>
-            <p:cNvPr id="23" name="pl22"/>
+            <p:cNvPr id="24" name="pl23"/>
             <p:cNvSpPr/>
             <p:nvPr/>
           </p:nvSpPr>
@@ -3084,7 +3127,7 @@
         </p:sp>
         <p:sp>
           <p:nvSpPr>
-            <p:cNvPr id="24" name="pl23"/>
+            <p:cNvPr id="25" name="pl24"/>
             <p:cNvSpPr/>
             <p:nvPr/>
           </p:nvSpPr>
@@ -3127,7 +3170,7 @@
         </p:sp>
         <p:sp>
           <p:nvSpPr>
-            <p:cNvPr id="25" name="pl24"/>
+            <p:cNvPr id="26" name="pl25"/>
             <p:cNvSpPr/>
             <p:nvPr/>
           </p:nvSpPr>
@@ -3170,13 +3213,13 @@
         </p:sp>
         <p:sp>
           <p:nvSpPr>
-            <p:cNvPr id="26" name="pl25"/>
-            <p:cNvSpPr/>
-            <p:nvPr/>
-          </p:nvSpPr>
-          <p:spPr>
-            <a:xfrm>
-              <a:off x="1428330" y="4042336"/>
+            <p:cNvPr id="27" name="pl26"/>
+            <p:cNvSpPr/>
+            <p:nvPr/>
+          </p:nvSpPr>
+          <p:spPr>
+            <a:xfrm>
+              <a:off x="1428330" y="4027153"/>
               <a:ext cx="4260935" cy="0"/>
             </a:xfrm>
             <a:custGeom>
@@ -3213,13 +3256,13 @@
         </p:sp>
         <p:sp>
           <p:nvSpPr>
-            <p:cNvPr id="27" name="pl26"/>
-            <p:cNvSpPr/>
-            <p:nvPr/>
-          </p:nvSpPr>
-          <p:spPr>
-            <a:xfrm>
-              <a:off x="1428330" y="3075389"/>
+            <p:cNvPr id="28" name="pl27"/>
+            <p:cNvSpPr/>
+            <p:nvPr/>
+          </p:nvSpPr>
+          <p:spPr>
+            <a:xfrm>
+              <a:off x="1428330" y="3179995"/>
               <a:ext cx="4260935" cy="0"/>
             </a:xfrm>
             <a:custGeom>
@@ -3256,13 +3299,13 @@
         </p:sp>
         <p:sp>
           <p:nvSpPr>
-            <p:cNvPr id="28" name="pl27"/>
-            <p:cNvSpPr/>
-            <p:nvPr/>
-          </p:nvSpPr>
-          <p:spPr>
-            <a:xfrm>
-              <a:off x="1428330" y="2108443"/>
+            <p:cNvPr id="29" name="pl28"/>
+            <p:cNvSpPr/>
+            <p:nvPr/>
+          </p:nvSpPr>
+          <p:spPr>
+            <a:xfrm>
+              <a:off x="1428330" y="2332837"/>
               <a:ext cx="4260935" cy="0"/>
             </a:xfrm>
             <a:custGeom>
@@ -3299,13 +3342,13 @@
         </p:sp>
         <p:sp>
           <p:nvSpPr>
-            <p:cNvPr id="29" name="pl28"/>
-            <p:cNvSpPr/>
-            <p:nvPr/>
-          </p:nvSpPr>
-          <p:spPr>
-            <a:xfrm>
-              <a:off x="1428330" y="1141497"/>
+            <p:cNvPr id="30" name="pl29"/>
+            <p:cNvSpPr/>
+            <p:nvPr/>
+          </p:nvSpPr>
+          <p:spPr>
+            <a:xfrm>
+              <a:off x="1428330" y="1485678"/>
               <a:ext cx="4260935" cy="0"/>
             </a:xfrm>
             <a:custGeom>
@@ -3342,7 +3385,7 @@
         </p:sp>
         <p:sp>
           <p:nvSpPr>
-            <p:cNvPr id="30" name="pl29"/>
+            <p:cNvPr id="31" name="pl30"/>
             <p:cNvSpPr/>
             <p:nvPr/>
           </p:nvSpPr>
@@ -3385,7 +3428,7 @@
         </p:sp>
         <p:sp>
           <p:nvSpPr>
-            <p:cNvPr id="31" name="pl30"/>
+            <p:cNvPr id="32" name="pl31"/>
             <p:cNvSpPr/>
             <p:nvPr/>
           </p:nvSpPr>
@@ -3428,7 +3471,7 @@
         </p:sp>
         <p:sp>
           <p:nvSpPr>
-            <p:cNvPr id="32" name="pl31"/>
+            <p:cNvPr id="33" name="pl32"/>
             <p:cNvSpPr/>
             <p:nvPr/>
           </p:nvSpPr>
@@ -3471,7 +3514,7 @@
         </p:sp>
         <p:sp>
           <p:nvSpPr>
-            <p:cNvPr id="33" name="pl32"/>
+            <p:cNvPr id="34" name="pl33"/>
             <p:cNvSpPr/>
             <p:nvPr/>
           </p:nvSpPr>
@@ -3514,7 +3557,7 @@
         </p:sp>
         <p:sp>
           <p:nvSpPr>
-            <p:cNvPr id="34" name="pl33"/>
+            <p:cNvPr id="35" name="pl34"/>
             <p:cNvSpPr/>
             <p:nvPr/>
           </p:nvSpPr>
@@ -3557,7 +3600,7 @@
         </p:sp>
         <p:sp>
           <p:nvSpPr>
-            <p:cNvPr id="35" name="pl34"/>
+            <p:cNvPr id="36" name="pl35"/>
             <p:cNvSpPr/>
             <p:nvPr/>
           </p:nvSpPr>
@@ -3600,7 +3643,7 @@
         </p:sp>
         <p:sp>
           <p:nvSpPr>
-            <p:cNvPr id="36" name="pl35"/>
+            <p:cNvPr id="37" name="pl36"/>
             <p:cNvSpPr/>
             <p:nvPr/>
           </p:nvSpPr>
@@ -3643,7 +3686,7 @@
         </p:sp>
         <p:sp>
           <p:nvSpPr>
-            <p:cNvPr id="37" name="pl36"/>
+            <p:cNvPr id="38" name="pl37"/>
             <p:cNvSpPr/>
             <p:nvPr/>
           </p:nvSpPr>
@@ -3686,7 +3729,7 @@
         </p:sp>
         <p:sp>
           <p:nvSpPr>
-            <p:cNvPr id="38" name="pl37"/>
+            <p:cNvPr id="39" name="pl38"/>
             <p:cNvSpPr/>
             <p:nvPr/>
           </p:nvSpPr>
@@ -3729,7 +3772,7 @@
         </p:sp>
         <p:sp>
           <p:nvSpPr>
-            <p:cNvPr id="39" name="pl38"/>
+            <p:cNvPr id="40" name="pl39"/>
             <p:cNvSpPr/>
             <p:nvPr/>
           </p:nvSpPr>
@@ -3772,7 +3815,7 @@
         </p:sp>
         <p:sp>
           <p:nvSpPr>
-            <p:cNvPr id="40" name="pl39"/>
+            <p:cNvPr id="41" name="pl40"/>
             <p:cNvSpPr/>
             <p:nvPr/>
           </p:nvSpPr>
@@ -3815,7 +3858,7 @@
         </p:sp>
         <p:sp>
           <p:nvSpPr>
-            <p:cNvPr id="41" name="pl40"/>
+            <p:cNvPr id="42" name="pl41"/>
             <p:cNvSpPr/>
             <p:nvPr/>
           </p:nvSpPr>
@@ -3858,7 +3901,7 @@
         </p:sp>
         <p:sp>
           <p:nvSpPr>
-            <p:cNvPr id="42" name="pl41"/>
+            <p:cNvPr id="43" name="pl42"/>
             <p:cNvSpPr/>
             <p:nvPr/>
           </p:nvSpPr>
@@ -3901,7 +3944,7 @@
         </p:sp>
         <p:sp>
           <p:nvSpPr>
-            <p:cNvPr id="43" name="pl42"/>
+            <p:cNvPr id="44" name="pl43"/>
             <p:cNvSpPr/>
             <p:nvPr/>
           </p:nvSpPr>
@@ -3944,93 +3987,180 @@
         </p:sp>
         <p:sp>
           <p:nvSpPr>
-            <p:cNvPr id="44" name="pl43"/>
-            <p:cNvSpPr/>
-            <p:nvPr/>
-          </p:nvSpPr>
-          <p:spPr>
-            <a:xfrm>
-              <a:off x="2446938" y="1128901"/>
-              <a:ext cx="2905183" cy="2898252"/>
+            <p:cNvPr id="45" name="pl44"/>
+            <p:cNvSpPr/>
+            <p:nvPr/>
+          </p:nvSpPr>
+          <p:spPr>
+            <a:xfrm>
+              <a:off x="1657876" y="1128901"/>
+              <a:ext cx="3801845" cy="2898252"/>
             </a:xfrm>
             <a:custGeom>
               <a:avLst/>
               <a:pathLst>
-                <a:path w="2905183" h="2898252">
+                <a:path w="3801845" h="2898252">
                   <a:moveTo>
                     <a:pt x="0" y="2898252"/>
                   </a:moveTo>
                   <a:lnTo>
-                    <a:pt x="932528" y="2437449"/>
-                  </a:lnTo>
-                  <a:lnTo>
-                    <a:pt x="1075993" y="2266393"/>
-                  </a:lnTo>
-                  <a:lnTo>
-                    <a:pt x="1183593" y="2099343"/>
-                  </a:lnTo>
-                  <a:lnTo>
-                    <a:pt x="1291192" y="1777029"/>
-                  </a:lnTo>
-                  <a:lnTo>
-                    <a:pt x="1362925" y="1446454"/>
-                  </a:lnTo>
-                  <a:lnTo>
-                    <a:pt x="1434658" y="1037753"/>
-                  </a:lnTo>
-                  <a:lnTo>
-                    <a:pt x="1506391" y="639044"/>
-                  </a:lnTo>
-                  <a:lnTo>
-                    <a:pt x="1578124" y="278023"/>
-                  </a:lnTo>
-                  <a:lnTo>
-                    <a:pt x="1649857" y="0"/>
-                  </a:lnTo>
-                  <a:lnTo>
-                    <a:pt x="1721590" y="8229"/>
-                  </a:lnTo>
-                  <a:lnTo>
-                    <a:pt x="1793323" y="272083"/>
-                  </a:lnTo>
-                  <a:lnTo>
-                    <a:pt x="1865056" y="639129"/>
-                  </a:lnTo>
-                  <a:lnTo>
-                    <a:pt x="1936789" y="1008290"/>
-                  </a:lnTo>
-                  <a:lnTo>
-                    <a:pt x="2008521" y="1303866"/>
-                  </a:lnTo>
-                  <a:lnTo>
-                    <a:pt x="2080254" y="1519606"/>
-                  </a:lnTo>
-                  <a:lnTo>
-                    <a:pt x="2187854" y="1669523"/>
-                  </a:lnTo>
-                  <a:lnTo>
-                    <a:pt x="2295453" y="1605244"/>
-                  </a:lnTo>
-                  <a:lnTo>
-                    <a:pt x="2367186" y="1504418"/>
-                  </a:lnTo>
-                  <a:lnTo>
-                    <a:pt x="2438919" y="1409124"/>
-                  </a:lnTo>
-                  <a:lnTo>
-                    <a:pt x="2510652" y="1364915"/>
-                  </a:lnTo>
-                  <a:lnTo>
-                    <a:pt x="2582385" y="1487332"/>
-                  </a:lnTo>
-                  <a:lnTo>
-                    <a:pt x="2654118" y="1724507"/>
-                  </a:lnTo>
-                  <a:lnTo>
-                    <a:pt x="2725851" y="2011326"/>
-                  </a:lnTo>
-                  <a:lnTo>
-                    <a:pt x="2905183" y="2580390"/>
+                    <a:pt x="71732" y="2898252"/>
+                  </a:lnTo>
+                  <a:lnTo>
+                    <a:pt x="143465" y="2898252"/>
+                  </a:lnTo>
+                  <a:lnTo>
+                    <a:pt x="215198" y="2898252"/>
+                  </a:lnTo>
+                  <a:lnTo>
+                    <a:pt x="286931" y="2898252"/>
+                  </a:lnTo>
+                  <a:lnTo>
+                    <a:pt x="358664" y="2898251"/>
+                  </a:lnTo>
+                  <a:lnTo>
+                    <a:pt x="430397" y="2898251"/>
+                  </a:lnTo>
+                  <a:lnTo>
+                    <a:pt x="502130" y="2898250"/>
+                  </a:lnTo>
+                  <a:lnTo>
+                    <a:pt x="573863" y="2898248"/>
+                  </a:lnTo>
+                  <a:lnTo>
+                    <a:pt x="645596" y="2898244"/>
+                  </a:lnTo>
+                  <a:lnTo>
+                    <a:pt x="717329" y="2898235"/>
+                  </a:lnTo>
+                  <a:lnTo>
+                    <a:pt x="789062" y="2898217"/>
+                  </a:lnTo>
+                  <a:lnTo>
+                    <a:pt x="860795" y="2898178"/>
+                  </a:lnTo>
+                  <a:lnTo>
+                    <a:pt x="932528" y="2898096"/>
+                  </a:lnTo>
+                  <a:lnTo>
+                    <a:pt x="1004260" y="2897923"/>
+                  </a:lnTo>
+                  <a:lnTo>
+                    <a:pt x="1075993" y="2897557"/>
+                  </a:lnTo>
+                  <a:lnTo>
+                    <a:pt x="1147726" y="2896784"/>
+                  </a:lnTo>
+                  <a:lnTo>
+                    <a:pt x="1219459" y="2895157"/>
+                  </a:lnTo>
+                  <a:lnTo>
+                    <a:pt x="1291192" y="2891739"/>
+                  </a:lnTo>
+                  <a:lnTo>
+                    <a:pt x="1362925" y="2884594"/>
+                  </a:lnTo>
+                  <a:lnTo>
+                    <a:pt x="1434658" y="2869958"/>
+                  </a:lnTo>
+                  <a:lnTo>
+                    <a:pt x="1506391" y="2840174"/>
+                  </a:lnTo>
+                  <a:lnTo>
+                    <a:pt x="1578124" y="2786199"/>
+                  </a:lnTo>
+                  <a:lnTo>
+                    <a:pt x="1649857" y="2686089"/>
+                  </a:lnTo>
+                  <a:lnTo>
+                    <a:pt x="1721590" y="2533358"/>
+                  </a:lnTo>
+                  <a:lnTo>
+                    <a:pt x="1793323" y="2338208"/>
+                  </a:lnTo>
+                  <a:lnTo>
+                    <a:pt x="1865056" y="2269736"/>
+                  </a:lnTo>
+                  <a:lnTo>
+                    <a:pt x="1936789" y="2213760"/>
+                  </a:lnTo>
+                  <a:lnTo>
+                    <a:pt x="2008521" y="2174852"/>
+                  </a:lnTo>
+                  <a:lnTo>
+                    <a:pt x="2080254" y="1977336"/>
+                  </a:lnTo>
+                  <a:lnTo>
+                    <a:pt x="2151987" y="1643795"/>
+                  </a:lnTo>
+                  <a:lnTo>
+                    <a:pt x="2223720" y="1272446"/>
+                  </a:lnTo>
+                  <a:lnTo>
+                    <a:pt x="2295453" y="839289"/>
+                  </a:lnTo>
+                  <a:lnTo>
+                    <a:pt x="2367186" y="504514"/>
+                  </a:lnTo>
+                  <a:lnTo>
+                    <a:pt x="2438919" y="206379"/>
+                  </a:lnTo>
+                  <a:lnTo>
+                    <a:pt x="2510652" y="0"/>
+                  </a:lnTo>
+                  <a:lnTo>
+                    <a:pt x="2582385" y="407635"/>
+                  </a:lnTo>
+                  <a:lnTo>
+                    <a:pt x="2654118" y="986104"/>
+                  </a:lnTo>
+                  <a:lnTo>
+                    <a:pt x="2725851" y="1324763"/>
+                  </a:lnTo>
+                  <a:lnTo>
+                    <a:pt x="2797584" y="1611142"/>
+                  </a:lnTo>
+                  <a:lnTo>
+                    <a:pt x="2869317" y="1934937"/>
+                  </a:lnTo>
+                  <a:lnTo>
+                    <a:pt x="2941050" y="2083871"/>
+                  </a:lnTo>
+                  <a:lnTo>
+                    <a:pt x="3012782" y="2048536"/>
+                  </a:lnTo>
+                  <a:lnTo>
+                    <a:pt x="3084515" y="1894986"/>
+                  </a:lnTo>
+                  <a:lnTo>
+                    <a:pt x="3156248" y="1611910"/>
+                  </a:lnTo>
+                  <a:lnTo>
+                    <a:pt x="3227981" y="1425285"/>
+                  </a:lnTo>
+                  <a:lnTo>
+                    <a:pt x="3299714" y="1272410"/>
+                  </a:lnTo>
+                  <a:lnTo>
+                    <a:pt x="3371447" y="1425474"/>
+                  </a:lnTo>
+                  <a:lnTo>
+                    <a:pt x="3443180" y="1707050"/>
+                  </a:lnTo>
+                  <a:lnTo>
+                    <a:pt x="3514913" y="2158638"/>
+                  </a:lnTo>
+                  <a:lnTo>
+                    <a:pt x="3586646" y="2445226"/>
+                  </a:lnTo>
+                  <a:lnTo>
+                    <a:pt x="3658379" y="2624047"/>
+                  </a:lnTo>
+                  <a:lnTo>
+                    <a:pt x="3730112" y="2711385"/>
+                  </a:lnTo>
+                  <a:lnTo>
+                    <a:pt x="3801845" y="2766225"/>
                   </a:lnTo>
                 </a:path>
               </a:pathLst>
@@ -4053,13 +4183,13 @@
         </p:sp>
         <p:sp>
           <p:nvSpPr>
-            <p:cNvPr id="45" name="pt44"/>
-            <p:cNvSpPr/>
-            <p:nvPr/>
-          </p:nvSpPr>
-          <p:spPr>
-            <a:xfrm>
-              <a:off x="2422112" y="4002328"/>
+            <p:cNvPr id="46" name="pt45"/>
+            <p:cNvSpPr/>
+            <p:nvPr/>
+          </p:nvSpPr>
+          <p:spPr>
+            <a:xfrm>
+              <a:off x="1633050" y="4002328"/>
               <a:ext cx="49651" cy="49651"/>
             </a:xfrm>
             <a:prstGeom prst="ellipse">
@@ -4088,13 +4218,13 @@
         </p:sp>
         <p:sp>
           <p:nvSpPr>
-            <p:cNvPr id="46" name="pt45"/>
-            <p:cNvSpPr/>
-            <p:nvPr/>
-          </p:nvSpPr>
-          <p:spPr>
-            <a:xfrm>
-              <a:off x="3354640" y="3541525"/>
+            <p:cNvPr id="47" name="pt46"/>
+            <p:cNvSpPr/>
+            <p:nvPr/>
+          </p:nvSpPr>
+          <p:spPr>
+            <a:xfrm>
+              <a:off x="1704783" y="4002328"/>
               <a:ext cx="49651" cy="49651"/>
             </a:xfrm>
             <a:prstGeom prst="ellipse">
@@ -4123,13 +4253,13 @@
         </p:sp>
         <p:sp>
           <p:nvSpPr>
-            <p:cNvPr id="47" name="pt46"/>
-            <p:cNvSpPr/>
-            <p:nvPr/>
-          </p:nvSpPr>
-          <p:spPr>
-            <a:xfrm>
-              <a:off x="3498106" y="3370469"/>
+            <p:cNvPr id="48" name="pt47"/>
+            <p:cNvSpPr/>
+            <p:nvPr/>
+          </p:nvSpPr>
+          <p:spPr>
+            <a:xfrm>
+              <a:off x="1776516" y="4002327"/>
               <a:ext cx="49651" cy="49651"/>
             </a:xfrm>
             <a:prstGeom prst="ellipse">
@@ -4158,13 +4288,13 @@
         </p:sp>
         <p:sp>
           <p:nvSpPr>
-            <p:cNvPr id="48" name="pt47"/>
-            <p:cNvSpPr/>
-            <p:nvPr/>
-          </p:nvSpPr>
-          <p:spPr>
-            <a:xfrm>
-              <a:off x="3605705" y="3203419"/>
+            <p:cNvPr id="49" name="pt48"/>
+            <p:cNvSpPr/>
+            <p:nvPr/>
+          </p:nvSpPr>
+          <p:spPr>
+            <a:xfrm>
+              <a:off x="1848249" y="4002327"/>
               <a:ext cx="49651" cy="49651"/>
             </a:xfrm>
             <a:prstGeom prst="ellipse">
@@ -4193,13 +4323,13 @@
         </p:sp>
         <p:sp>
           <p:nvSpPr>
-            <p:cNvPr id="49" name="pt48"/>
-            <p:cNvSpPr/>
-            <p:nvPr/>
-          </p:nvSpPr>
-          <p:spPr>
-            <a:xfrm>
-              <a:off x="3713305" y="2881104"/>
+            <p:cNvPr id="50" name="pt49"/>
+            <p:cNvSpPr/>
+            <p:nvPr/>
+          </p:nvSpPr>
+          <p:spPr>
+            <a:xfrm>
+              <a:off x="1919981" y="4002327"/>
               <a:ext cx="49651" cy="49651"/>
             </a:xfrm>
             <a:prstGeom prst="ellipse">
@@ -4228,13 +4358,13 @@
         </p:sp>
         <p:sp>
           <p:nvSpPr>
-            <p:cNvPr id="50" name="pt49"/>
-            <p:cNvSpPr/>
-            <p:nvPr/>
-          </p:nvSpPr>
-          <p:spPr>
-            <a:xfrm>
-              <a:off x="3785038" y="2550530"/>
+            <p:cNvPr id="51" name="pt50"/>
+            <p:cNvSpPr/>
+            <p:nvPr/>
+          </p:nvSpPr>
+          <p:spPr>
+            <a:xfrm>
+              <a:off x="1991714" y="4002327"/>
               <a:ext cx="49651" cy="49651"/>
             </a:xfrm>
             <a:prstGeom prst="ellipse">
@@ -4263,13 +4393,13 @@
         </p:sp>
         <p:sp>
           <p:nvSpPr>
-            <p:cNvPr id="51" name="pt50"/>
-            <p:cNvSpPr/>
-            <p:nvPr/>
-          </p:nvSpPr>
-          <p:spPr>
-            <a:xfrm>
-              <a:off x="3856770" y="2141829"/>
+            <p:cNvPr id="52" name="pt51"/>
+            <p:cNvSpPr/>
+            <p:nvPr/>
+          </p:nvSpPr>
+          <p:spPr>
+            <a:xfrm>
+              <a:off x="2063447" y="4002327"/>
               <a:ext cx="49651" cy="49651"/>
             </a:xfrm>
             <a:prstGeom prst="ellipse">
@@ -4298,13 +4428,13 @@
         </p:sp>
         <p:sp>
           <p:nvSpPr>
-            <p:cNvPr id="52" name="pt51"/>
-            <p:cNvSpPr/>
-            <p:nvPr/>
-          </p:nvSpPr>
-          <p:spPr>
-            <a:xfrm>
-              <a:off x="3928503" y="1743120"/>
+            <p:cNvPr id="53" name="pt52"/>
+            <p:cNvSpPr/>
+            <p:nvPr/>
+          </p:nvSpPr>
+          <p:spPr>
+            <a:xfrm>
+              <a:off x="2135180" y="4002326"/>
               <a:ext cx="49651" cy="49651"/>
             </a:xfrm>
             <a:prstGeom prst="ellipse">
@@ -4333,13 +4463,13 @@
         </p:sp>
         <p:sp>
           <p:nvSpPr>
-            <p:cNvPr id="53" name="pt52"/>
-            <p:cNvSpPr/>
-            <p:nvPr/>
-          </p:nvSpPr>
-          <p:spPr>
-            <a:xfrm>
-              <a:off x="4000236" y="1382099"/>
+            <p:cNvPr id="54" name="pt53"/>
+            <p:cNvSpPr/>
+            <p:nvPr/>
+          </p:nvSpPr>
+          <p:spPr>
+            <a:xfrm>
+              <a:off x="2206913" y="4002324"/>
               <a:ext cx="49651" cy="49651"/>
             </a:xfrm>
             <a:prstGeom prst="ellipse">
@@ -4368,13 +4498,13 @@
         </p:sp>
         <p:sp>
           <p:nvSpPr>
-            <p:cNvPr id="54" name="pt53"/>
-            <p:cNvSpPr/>
-            <p:nvPr/>
-          </p:nvSpPr>
-          <p:spPr>
-            <a:xfrm>
-              <a:off x="4071969" y="1104075"/>
+            <p:cNvPr id="55" name="pt54"/>
+            <p:cNvSpPr/>
+            <p:nvPr/>
+          </p:nvSpPr>
+          <p:spPr>
+            <a:xfrm>
+              <a:off x="2278646" y="4002320"/>
               <a:ext cx="49651" cy="49651"/>
             </a:xfrm>
             <a:prstGeom prst="ellipse">
@@ -4403,13 +4533,13 @@
         </p:sp>
         <p:sp>
           <p:nvSpPr>
-            <p:cNvPr id="55" name="pt54"/>
-            <p:cNvSpPr/>
-            <p:nvPr/>
-          </p:nvSpPr>
-          <p:spPr>
-            <a:xfrm>
-              <a:off x="4143702" y="1112305"/>
+            <p:cNvPr id="56" name="pt55"/>
+            <p:cNvSpPr/>
+            <p:nvPr/>
+          </p:nvSpPr>
+          <p:spPr>
+            <a:xfrm>
+              <a:off x="2350379" y="4002311"/>
               <a:ext cx="49651" cy="49651"/>
             </a:xfrm>
             <a:prstGeom prst="ellipse">
@@ -4438,13 +4568,13 @@
         </p:sp>
         <p:sp>
           <p:nvSpPr>
-            <p:cNvPr id="56" name="pt55"/>
-            <p:cNvSpPr/>
-            <p:nvPr/>
-          </p:nvSpPr>
-          <p:spPr>
-            <a:xfrm>
-              <a:off x="4215435" y="1376159"/>
+            <p:cNvPr id="57" name="pt56"/>
+            <p:cNvSpPr/>
+            <p:nvPr/>
+          </p:nvSpPr>
+          <p:spPr>
+            <a:xfrm>
+              <a:off x="2422112" y="4002293"/>
               <a:ext cx="49651" cy="49651"/>
             </a:xfrm>
             <a:prstGeom prst="ellipse">
@@ -4473,13 +4603,13 @@
         </p:sp>
         <p:sp>
           <p:nvSpPr>
-            <p:cNvPr id="57" name="pt56"/>
-            <p:cNvSpPr/>
-            <p:nvPr/>
-          </p:nvSpPr>
-          <p:spPr>
-            <a:xfrm>
-              <a:off x="4287168" y="1743204"/>
+            <p:cNvPr id="58" name="pt57"/>
+            <p:cNvSpPr/>
+            <p:nvPr/>
+          </p:nvSpPr>
+          <p:spPr>
+            <a:xfrm>
+              <a:off x="2493845" y="4002254"/>
               <a:ext cx="49651" cy="49651"/>
             </a:xfrm>
             <a:prstGeom prst="ellipse">
@@ -4508,13 +4638,13 @@
         </p:sp>
         <p:sp>
           <p:nvSpPr>
-            <p:cNvPr id="58" name="pt57"/>
-            <p:cNvSpPr/>
-            <p:nvPr/>
-          </p:nvSpPr>
-          <p:spPr>
-            <a:xfrm>
-              <a:off x="4358901" y="2112365"/>
+            <p:cNvPr id="59" name="pt58"/>
+            <p:cNvSpPr/>
+            <p:nvPr/>
+          </p:nvSpPr>
+          <p:spPr>
+            <a:xfrm>
+              <a:off x="2565578" y="4002172"/>
               <a:ext cx="49651" cy="49651"/>
             </a:xfrm>
             <a:prstGeom prst="ellipse">
@@ -4543,13 +4673,13 @@
         </p:sp>
         <p:sp>
           <p:nvSpPr>
-            <p:cNvPr id="59" name="pt58"/>
-            <p:cNvSpPr/>
-            <p:nvPr/>
-          </p:nvSpPr>
-          <p:spPr>
-            <a:xfrm>
-              <a:off x="4430634" y="2407942"/>
+            <p:cNvPr id="60" name="pt59"/>
+            <p:cNvSpPr/>
+            <p:nvPr/>
+          </p:nvSpPr>
+          <p:spPr>
+            <a:xfrm>
+              <a:off x="2637311" y="4001998"/>
               <a:ext cx="49651" cy="49651"/>
             </a:xfrm>
             <a:prstGeom prst="ellipse">
@@ -4578,13 +4708,13 @@
         </p:sp>
         <p:sp>
           <p:nvSpPr>
-            <p:cNvPr id="60" name="pt59"/>
-            <p:cNvSpPr/>
-            <p:nvPr/>
-          </p:nvSpPr>
-          <p:spPr>
-            <a:xfrm>
-              <a:off x="4502367" y="2623682"/>
+            <p:cNvPr id="61" name="pt60"/>
+            <p:cNvSpPr/>
+            <p:nvPr/>
+          </p:nvSpPr>
+          <p:spPr>
+            <a:xfrm>
+              <a:off x="2709044" y="4001633"/>
               <a:ext cx="49651" cy="49651"/>
             </a:xfrm>
             <a:prstGeom prst="ellipse">
@@ -4613,13 +4743,13 @@
         </p:sp>
         <p:sp>
           <p:nvSpPr>
-            <p:cNvPr id="61" name="pt60"/>
-            <p:cNvSpPr/>
-            <p:nvPr/>
-          </p:nvSpPr>
-          <p:spPr>
-            <a:xfrm>
-              <a:off x="4609966" y="2773599"/>
+            <p:cNvPr id="62" name="pt61"/>
+            <p:cNvSpPr/>
+            <p:nvPr/>
+          </p:nvSpPr>
+          <p:spPr>
+            <a:xfrm>
+              <a:off x="2780777" y="4000860"/>
               <a:ext cx="49651" cy="49651"/>
             </a:xfrm>
             <a:prstGeom prst="ellipse">
@@ -4648,13 +4778,13 @@
         </p:sp>
         <p:sp>
           <p:nvSpPr>
-            <p:cNvPr id="62" name="pt61"/>
-            <p:cNvSpPr/>
-            <p:nvPr/>
-          </p:nvSpPr>
-          <p:spPr>
-            <a:xfrm>
-              <a:off x="4717566" y="2709320"/>
+            <p:cNvPr id="63" name="pt62"/>
+            <p:cNvSpPr/>
+            <p:nvPr/>
+          </p:nvSpPr>
+          <p:spPr>
+            <a:xfrm>
+              <a:off x="2852510" y="3999233"/>
               <a:ext cx="49651" cy="49651"/>
             </a:xfrm>
             <a:prstGeom prst="ellipse">
@@ -4683,13 +4813,13 @@
         </p:sp>
         <p:sp>
           <p:nvSpPr>
-            <p:cNvPr id="63" name="pt62"/>
-            <p:cNvSpPr/>
-            <p:nvPr/>
-          </p:nvSpPr>
-          <p:spPr>
-            <a:xfrm>
-              <a:off x="4789299" y="2608494"/>
+            <p:cNvPr id="64" name="pt63"/>
+            <p:cNvSpPr/>
+            <p:nvPr/>
+          </p:nvSpPr>
+          <p:spPr>
+            <a:xfrm>
+              <a:off x="2924242" y="3995814"/>
               <a:ext cx="49651" cy="49651"/>
             </a:xfrm>
             <a:prstGeom prst="ellipse">
@@ -4718,13 +4848,13 @@
         </p:sp>
         <p:sp>
           <p:nvSpPr>
-            <p:cNvPr id="64" name="pt63"/>
-            <p:cNvSpPr/>
-            <p:nvPr/>
-          </p:nvSpPr>
-          <p:spPr>
-            <a:xfrm>
-              <a:off x="4861031" y="2513200"/>
+            <p:cNvPr id="65" name="pt64"/>
+            <p:cNvSpPr/>
+            <p:nvPr/>
+          </p:nvSpPr>
+          <p:spPr>
+            <a:xfrm>
+              <a:off x="2995975" y="3988670"/>
               <a:ext cx="49651" cy="49651"/>
             </a:xfrm>
             <a:prstGeom prst="ellipse">
@@ -4753,13 +4883,13 @@
         </p:sp>
         <p:sp>
           <p:nvSpPr>
-            <p:cNvPr id="65" name="pt64"/>
-            <p:cNvSpPr/>
-            <p:nvPr/>
-          </p:nvSpPr>
-          <p:spPr>
-            <a:xfrm>
-              <a:off x="4932764" y="2468991"/>
+            <p:cNvPr id="66" name="pt65"/>
+            <p:cNvSpPr/>
+            <p:nvPr/>
+          </p:nvSpPr>
+          <p:spPr>
+            <a:xfrm>
+              <a:off x="3067708" y="3974033"/>
               <a:ext cx="49651" cy="49651"/>
             </a:xfrm>
             <a:prstGeom prst="ellipse">
@@ -4788,13 +4918,13 @@
         </p:sp>
         <p:sp>
           <p:nvSpPr>
-            <p:cNvPr id="66" name="pt65"/>
-            <p:cNvSpPr/>
-            <p:nvPr/>
-          </p:nvSpPr>
-          <p:spPr>
-            <a:xfrm>
-              <a:off x="5004497" y="2591407"/>
+            <p:cNvPr id="67" name="pt66"/>
+            <p:cNvSpPr/>
+            <p:nvPr/>
+          </p:nvSpPr>
+          <p:spPr>
+            <a:xfrm>
+              <a:off x="3139441" y="3944250"/>
               <a:ext cx="49651" cy="49651"/>
             </a:xfrm>
             <a:prstGeom prst="ellipse">
@@ -4823,13 +4953,13 @@
         </p:sp>
         <p:sp>
           <p:nvSpPr>
-            <p:cNvPr id="67" name="pt66"/>
-            <p:cNvSpPr/>
-            <p:nvPr/>
-          </p:nvSpPr>
-          <p:spPr>
-            <a:xfrm>
-              <a:off x="5076230" y="2828582"/>
+            <p:cNvPr id="68" name="pt67"/>
+            <p:cNvSpPr/>
+            <p:nvPr/>
+          </p:nvSpPr>
+          <p:spPr>
+            <a:xfrm>
+              <a:off x="3211174" y="3890275"/>
               <a:ext cx="49651" cy="49651"/>
             </a:xfrm>
             <a:prstGeom prst="ellipse">
@@ -4858,13 +4988,13 @@
         </p:sp>
         <p:sp>
           <p:nvSpPr>
-            <p:cNvPr id="68" name="pt67"/>
-            <p:cNvSpPr/>
-            <p:nvPr/>
-          </p:nvSpPr>
-          <p:spPr>
-            <a:xfrm>
-              <a:off x="5147963" y="3115402"/>
+            <p:cNvPr id="69" name="pt68"/>
+            <p:cNvSpPr/>
+            <p:nvPr/>
+          </p:nvSpPr>
+          <p:spPr>
+            <a:xfrm>
+              <a:off x="3282907" y="3790165"/>
               <a:ext cx="49651" cy="49651"/>
             </a:xfrm>
             <a:prstGeom prst="ellipse">
@@ -4893,13 +5023,13 @@
         </p:sp>
         <p:sp>
           <p:nvSpPr>
-            <p:cNvPr id="69" name="pt68"/>
-            <p:cNvSpPr/>
-            <p:nvPr/>
-          </p:nvSpPr>
-          <p:spPr>
-            <a:xfrm>
-              <a:off x="5327296" y="3684465"/>
+            <p:cNvPr id="70" name="pt69"/>
+            <p:cNvSpPr/>
+            <p:nvPr/>
+          </p:nvSpPr>
+          <p:spPr>
+            <a:xfrm>
+              <a:off x="3354640" y="3637434"/>
               <a:ext cx="49651" cy="49651"/>
             </a:xfrm>
             <a:prstGeom prst="ellipse">
@@ -4928,13 +5058,1028 @@
         </p:sp>
         <p:sp>
           <p:nvSpPr>
-            <p:cNvPr id="70" name="tx69"/>
-            <p:cNvSpPr/>
-            <p:nvPr/>
-          </p:nvSpPr>
-          <p:spPr>
-            <a:xfrm>
-              <a:off x="1148183" y="4000644"/>
+            <p:cNvPr id="71" name="pt70"/>
+            <p:cNvSpPr/>
+            <p:nvPr/>
+          </p:nvSpPr>
+          <p:spPr>
+            <a:xfrm>
+              <a:off x="3426373" y="3442283"/>
+              <a:ext cx="49651" cy="49651"/>
+            </a:xfrm>
+            <a:prstGeom prst="ellipse">
+              <a:avLst/>
+            </a:prstGeom>
+            <a:solidFill>
+              <a:srgbClr val="F8766D">
+                <a:alpha val="100000"/>
+              </a:srgbClr>
+            </a:solidFill>
+            <a:ln w="9000" cap="rnd">
+              <a:solidFill>
+                <a:srgbClr val="F8766D">
+                  <a:alpha val="100000"/>
+                </a:srgbClr>
+              </a:solidFill>
+              <a:prstDash val="solid"/>
+              <a:round/>
+            </a:ln>
+          </p:spPr>
+          <p:txBody>
+            <a:bodyPr/>
+            <a:lstStyle/>
+            <a:p/>
+          </p:txBody>
+        </p:sp>
+        <p:sp>
+          <p:nvSpPr>
+            <p:cNvPr id="72" name="pt71"/>
+            <p:cNvSpPr/>
+            <p:nvPr/>
+          </p:nvSpPr>
+          <p:spPr>
+            <a:xfrm>
+              <a:off x="3498106" y="3373812"/>
+              <a:ext cx="49651" cy="49651"/>
+            </a:xfrm>
+            <a:prstGeom prst="ellipse">
+              <a:avLst/>
+            </a:prstGeom>
+            <a:solidFill>
+              <a:srgbClr val="F8766D">
+                <a:alpha val="100000"/>
+              </a:srgbClr>
+            </a:solidFill>
+            <a:ln w="9000" cap="rnd">
+              <a:solidFill>
+                <a:srgbClr val="F8766D">
+                  <a:alpha val="100000"/>
+                </a:srgbClr>
+              </a:solidFill>
+              <a:prstDash val="solid"/>
+              <a:round/>
+            </a:ln>
+          </p:spPr>
+          <p:txBody>
+            <a:bodyPr/>
+            <a:lstStyle/>
+            <a:p/>
+          </p:txBody>
+        </p:sp>
+        <p:sp>
+          <p:nvSpPr>
+            <p:cNvPr id="73" name="pt72"/>
+            <p:cNvSpPr/>
+            <p:nvPr/>
+          </p:nvSpPr>
+          <p:spPr>
+            <a:xfrm>
+              <a:off x="3569839" y="3317836"/>
+              <a:ext cx="49651" cy="49651"/>
+            </a:xfrm>
+            <a:prstGeom prst="ellipse">
+              <a:avLst/>
+            </a:prstGeom>
+            <a:solidFill>
+              <a:srgbClr val="F8766D">
+                <a:alpha val="100000"/>
+              </a:srgbClr>
+            </a:solidFill>
+            <a:ln w="9000" cap="rnd">
+              <a:solidFill>
+                <a:srgbClr val="F8766D">
+                  <a:alpha val="100000"/>
+                </a:srgbClr>
+              </a:solidFill>
+              <a:prstDash val="solid"/>
+              <a:round/>
+            </a:ln>
+          </p:spPr>
+          <p:txBody>
+            <a:bodyPr/>
+            <a:lstStyle/>
+            <a:p/>
+          </p:txBody>
+        </p:sp>
+        <p:sp>
+          <p:nvSpPr>
+            <p:cNvPr id="74" name="pt73"/>
+            <p:cNvSpPr/>
+            <p:nvPr/>
+          </p:nvSpPr>
+          <p:spPr>
+            <a:xfrm>
+              <a:off x="3641572" y="3278928"/>
+              <a:ext cx="49651" cy="49651"/>
+            </a:xfrm>
+            <a:prstGeom prst="ellipse">
+              <a:avLst/>
+            </a:prstGeom>
+            <a:solidFill>
+              <a:srgbClr val="F8766D">
+                <a:alpha val="100000"/>
+              </a:srgbClr>
+            </a:solidFill>
+            <a:ln w="9000" cap="rnd">
+              <a:solidFill>
+                <a:srgbClr val="F8766D">
+                  <a:alpha val="100000"/>
+                </a:srgbClr>
+              </a:solidFill>
+              <a:prstDash val="solid"/>
+              <a:round/>
+            </a:ln>
+          </p:spPr>
+          <p:txBody>
+            <a:bodyPr/>
+            <a:lstStyle/>
+            <a:p/>
+          </p:txBody>
+        </p:sp>
+        <p:sp>
+          <p:nvSpPr>
+            <p:cNvPr id="75" name="pt74"/>
+            <p:cNvSpPr/>
+            <p:nvPr/>
+          </p:nvSpPr>
+          <p:spPr>
+            <a:xfrm>
+              <a:off x="3713305" y="3081411"/>
+              <a:ext cx="49651" cy="49651"/>
+            </a:xfrm>
+            <a:prstGeom prst="ellipse">
+              <a:avLst/>
+            </a:prstGeom>
+            <a:solidFill>
+              <a:srgbClr val="F8766D">
+                <a:alpha val="100000"/>
+              </a:srgbClr>
+            </a:solidFill>
+            <a:ln w="9000" cap="rnd">
+              <a:solidFill>
+                <a:srgbClr val="F8766D">
+                  <a:alpha val="100000"/>
+                </a:srgbClr>
+              </a:solidFill>
+              <a:prstDash val="solid"/>
+              <a:round/>
+            </a:ln>
+          </p:spPr>
+          <p:txBody>
+            <a:bodyPr/>
+            <a:lstStyle/>
+            <a:p/>
+          </p:txBody>
+        </p:sp>
+        <p:sp>
+          <p:nvSpPr>
+            <p:cNvPr id="76" name="pt75"/>
+            <p:cNvSpPr/>
+            <p:nvPr/>
+          </p:nvSpPr>
+          <p:spPr>
+            <a:xfrm>
+              <a:off x="3785038" y="2747871"/>
+              <a:ext cx="49651" cy="49651"/>
+            </a:xfrm>
+            <a:prstGeom prst="ellipse">
+              <a:avLst/>
+            </a:prstGeom>
+            <a:solidFill>
+              <a:srgbClr val="F8766D">
+                <a:alpha val="100000"/>
+              </a:srgbClr>
+            </a:solidFill>
+            <a:ln w="9000" cap="rnd">
+              <a:solidFill>
+                <a:srgbClr val="F8766D">
+                  <a:alpha val="100000"/>
+                </a:srgbClr>
+              </a:solidFill>
+              <a:prstDash val="solid"/>
+              <a:round/>
+            </a:ln>
+          </p:spPr>
+          <p:txBody>
+            <a:bodyPr/>
+            <a:lstStyle/>
+            <a:p/>
+          </p:txBody>
+        </p:sp>
+        <p:sp>
+          <p:nvSpPr>
+            <p:cNvPr id="77" name="pt76"/>
+            <p:cNvSpPr/>
+            <p:nvPr/>
+          </p:nvSpPr>
+          <p:spPr>
+            <a:xfrm>
+              <a:off x="3856770" y="2376521"/>
+              <a:ext cx="49651" cy="49651"/>
+            </a:xfrm>
+            <a:prstGeom prst="ellipse">
+              <a:avLst/>
+            </a:prstGeom>
+            <a:solidFill>
+              <a:srgbClr val="F8766D">
+                <a:alpha val="100000"/>
+              </a:srgbClr>
+            </a:solidFill>
+            <a:ln w="9000" cap="rnd">
+              <a:solidFill>
+                <a:srgbClr val="F8766D">
+                  <a:alpha val="100000"/>
+                </a:srgbClr>
+              </a:solidFill>
+              <a:prstDash val="solid"/>
+              <a:round/>
+            </a:ln>
+          </p:spPr>
+          <p:txBody>
+            <a:bodyPr/>
+            <a:lstStyle/>
+            <a:p/>
+          </p:txBody>
+        </p:sp>
+        <p:sp>
+          <p:nvSpPr>
+            <p:cNvPr id="78" name="pt77"/>
+            <p:cNvSpPr/>
+            <p:nvPr/>
+          </p:nvSpPr>
+          <p:spPr>
+            <a:xfrm>
+              <a:off x="3928503" y="1943364"/>
+              <a:ext cx="49651" cy="49651"/>
+            </a:xfrm>
+            <a:prstGeom prst="ellipse">
+              <a:avLst/>
+            </a:prstGeom>
+            <a:solidFill>
+              <a:srgbClr val="F8766D">
+                <a:alpha val="100000"/>
+              </a:srgbClr>
+            </a:solidFill>
+            <a:ln w="9000" cap="rnd">
+              <a:solidFill>
+                <a:srgbClr val="F8766D">
+                  <a:alpha val="100000"/>
+                </a:srgbClr>
+              </a:solidFill>
+              <a:prstDash val="solid"/>
+              <a:round/>
+            </a:ln>
+          </p:spPr>
+          <p:txBody>
+            <a:bodyPr/>
+            <a:lstStyle/>
+            <a:p/>
+          </p:txBody>
+        </p:sp>
+        <p:sp>
+          <p:nvSpPr>
+            <p:cNvPr id="79" name="pt78"/>
+            <p:cNvSpPr/>
+            <p:nvPr/>
+          </p:nvSpPr>
+          <p:spPr>
+            <a:xfrm>
+              <a:off x="4000236" y="1608590"/>
+              <a:ext cx="49651" cy="49651"/>
+            </a:xfrm>
+            <a:prstGeom prst="ellipse">
+              <a:avLst/>
+            </a:prstGeom>
+            <a:solidFill>
+              <a:srgbClr val="F8766D">
+                <a:alpha val="100000"/>
+              </a:srgbClr>
+            </a:solidFill>
+            <a:ln w="9000" cap="rnd">
+              <a:solidFill>
+                <a:srgbClr val="F8766D">
+                  <a:alpha val="100000"/>
+                </a:srgbClr>
+              </a:solidFill>
+              <a:prstDash val="solid"/>
+              <a:round/>
+            </a:ln>
+          </p:spPr>
+          <p:txBody>
+            <a:bodyPr/>
+            <a:lstStyle/>
+            <a:p/>
+          </p:txBody>
+        </p:sp>
+        <p:sp>
+          <p:nvSpPr>
+            <p:cNvPr id="80" name="pt79"/>
+            <p:cNvSpPr/>
+            <p:nvPr/>
+          </p:nvSpPr>
+          <p:spPr>
+            <a:xfrm>
+              <a:off x="4071969" y="1310454"/>
+              <a:ext cx="49651" cy="49651"/>
+            </a:xfrm>
+            <a:prstGeom prst="ellipse">
+              <a:avLst/>
+            </a:prstGeom>
+            <a:solidFill>
+              <a:srgbClr val="F8766D">
+                <a:alpha val="100000"/>
+              </a:srgbClr>
+            </a:solidFill>
+            <a:ln w="9000" cap="rnd">
+              <a:solidFill>
+                <a:srgbClr val="F8766D">
+                  <a:alpha val="100000"/>
+                </a:srgbClr>
+              </a:solidFill>
+              <a:prstDash val="solid"/>
+              <a:round/>
+            </a:ln>
+          </p:spPr>
+          <p:txBody>
+            <a:bodyPr/>
+            <a:lstStyle/>
+            <a:p/>
+          </p:txBody>
+        </p:sp>
+        <p:sp>
+          <p:nvSpPr>
+            <p:cNvPr id="81" name="pt80"/>
+            <p:cNvSpPr/>
+            <p:nvPr/>
+          </p:nvSpPr>
+          <p:spPr>
+            <a:xfrm>
+              <a:off x="4143702" y="1104075"/>
+              <a:ext cx="49651" cy="49651"/>
+            </a:xfrm>
+            <a:prstGeom prst="ellipse">
+              <a:avLst/>
+            </a:prstGeom>
+            <a:solidFill>
+              <a:srgbClr val="F8766D">
+                <a:alpha val="100000"/>
+              </a:srgbClr>
+            </a:solidFill>
+            <a:ln w="9000" cap="rnd">
+              <a:solidFill>
+                <a:srgbClr val="F8766D">
+                  <a:alpha val="100000"/>
+                </a:srgbClr>
+              </a:solidFill>
+              <a:prstDash val="solid"/>
+              <a:round/>
+            </a:ln>
+          </p:spPr>
+          <p:txBody>
+            <a:bodyPr/>
+            <a:lstStyle/>
+            <a:p/>
+          </p:txBody>
+        </p:sp>
+        <p:sp>
+          <p:nvSpPr>
+            <p:cNvPr id="82" name="pt81"/>
+            <p:cNvSpPr/>
+            <p:nvPr/>
+          </p:nvSpPr>
+          <p:spPr>
+            <a:xfrm>
+              <a:off x="4215435" y="1511711"/>
+              <a:ext cx="49651" cy="49651"/>
+            </a:xfrm>
+            <a:prstGeom prst="ellipse">
+              <a:avLst/>
+            </a:prstGeom>
+            <a:solidFill>
+              <a:srgbClr val="F8766D">
+                <a:alpha val="100000"/>
+              </a:srgbClr>
+            </a:solidFill>
+            <a:ln w="9000" cap="rnd">
+              <a:solidFill>
+                <a:srgbClr val="F8766D">
+                  <a:alpha val="100000"/>
+                </a:srgbClr>
+              </a:solidFill>
+              <a:prstDash val="solid"/>
+              <a:round/>
+            </a:ln>
+          </p:spPr>
+          <p:txBody>
+            <a:bodyPr/>
+            <a:lstStyle/>
+            <a:p/>
+          </p:txBody>
+        </p:sp>
+        <p:sp>
+          <p:nvSpPr>
+            <p:cNvPr id="83" name="pt82"/>
+            <p:cNvSpPr/>
+            <p:nvPr/>
+          </p:nvSpPr>
+          <p:spPr>
+            <a:xfrm>
+              <a:off x="4287168" y="2090180"/>
+              <a:ext cx="49651" cy="49651"/>
+            </a:xfrm>
+            <a:prstGeom prst="ellipse">
+              <a:avLst/>
+            </a:prstGeom>
+            <a:solidFill>
+              <a:srgbClr val="F8766D">
+                <a:alpha val="100000"/>
+              </a:srgbClr>
+            </a:solidFill>
+            <a:ln w="9000" cap="rnd">
+              <a:solidFill>
+                <a:srgbClr val="F8766D">
+                  <a:alpha val="100000"/>
+                </a:srgbClr>
+              </a:solidFill>
+              <a:prstDash val="solid"/>
+              <a:round/>
+            </a:ln>
+          </p:spPr>
+          <p:txBody>
+            <a:bodyPr/>
+            <a:lstStyle/>
+            <a:p/>
+          </p:txBody>
+        </p:sp>
+        <p:sp>
+          <p:nvSpPr>
+            <p:cNvPr id="84" name="pt83"/>
+            <p:cNvSpPr/>
+            <p:nvPr/>
+          </p:nvSpPr>
+          <p:spPr>
+            <a:xfrm>
+              <a:off x="4358901" y="2428838"/>
+              <a:ext cx="49651" cy="49651"/>
+            </a:xfrm>
+            <a:prstGeom prst="ellipse">
+              <a:avLst/>
+            </a:prstGeom>
+            <a:solidFill>
+              <a:srgbClr val="F8766D">
+                <a:alpha val="100000"/>
+              </a:srgbClr>
+            </a:solidFill>
+            <a:ln w="9000" cap="rnd">
+              <a:solidFill>
+                <a:srgbClr val="F8766D">
+                  <a:alpha val="100000"/>
+                </a:srgbClr>
+              </a:solidFill>
+              <a:prstDash val="solid"/>
+              <a:round/>
+            </a:ln>
+          </p:spPr>
+          <p:txBody>
+            <a:bodyPr/>
+            <a:lstStyle/>
+            <a:p/>
+          </p:txBody>
+        </p:sp>
+        <p:sp>
+          <p:nvSpPr>
+            <p:cNvPr id="85" name="pt84"/>
+            <p:cNvSpPr/>
+            <p:nvPr/>
+          </p:nvSpPr>
+          <p:spPr>
+            <a:xfrm>
+              <a:off x="4430634" y="2715217"/>
+              <a:ext cx="49651" cy="49651"/>
+            </a:xfrm>
+            <a:prstGeom prst="ellipse">
+              <a:avLst/>
+            </a:prstGeom>
+            <a:solidFill>
+              <a:srgbClr val="F8766D">
+                <a:alpha val="100000"/>
+              </a:srgbClr>
+            </a:solidFill>
+            <a:ln w="9000" cap="rnd">
+              <a:solidFill>
+                <a:srgbClr val="F8766D">
+                  <a:alpha val="100000"/>
+                </a:srgbClr>
+              </a:solidFill>
+              <a:prstDash val="solid"/>
+              <a:round/>
+            </a:ln>
+          </p:spPr>
+          <p:txBody>
+            <a:bodyPr/>
+            <a:lstStyle/>
+            <a:p/>
+          </p:txBody>
+        </p:sp>
+        <p:sp>
+          <p:nvSpPr>
+            <p:cNvPr id="86" name="pt85"/>
+            <p:cNvSpPr/>
+            <p:nvPr/>
+          </p:nvSpPr>
+          <p:spPr>
+            <a:xfrm>
+              <a:off x="4502367" y="3039013"/>
+              <a:ext cx="49651" cy="49651"/>
+            </a:xfrm>
+            <a:prstGeom prst="ellipse">
+              <a:avLst/>
+            </a:prstGeom>
+            <a:solidFill>
+              <a:srgbClr val="F8766D">
+                <a:alpha val="100000"/>
+              </a:srgbClr>
+            </a:solidFill>
+            <a:ln w="9000" cap="rnd">
+              <a:solidFill>
+                <a:srgbClr val="F8766D">
+                  <a:alpha val="100000"/>
+                </a:srgbClr>
+              </a:solidFill>
+              <a:prstDash val="solid"/>
+              <a:round/>
+            </a:ln>
+          </p:spPr>
+          <p:txBody>
+            <a:bodyPr/>
+            <a:lstStyle/>
+            <a:p/>
+          </p:txBody>
+        </p:sp>
+        <p:sp>
+          <p:nvSpPr>
+            <p:cNvPr id="87" name="pt86"/>
+            <p:cNvSpPr/>
+            <p:nvPr/>
+          </p:nvSpPr>
+          <p:spPr>
+            <a:xfrm>
+              <a:off x="4574100" y="3187947"/>
+              <a:ext cx="49651" cy="49651"/>
+            </a:xfrm>
+            <a:prstGeom prst="ellipse">
+              <a:avLst/>
+            </a:prstGeom>
+            <a:solidFill>
+              <a:srgbClr val="F8766D">
+                <a:alpha val="100000"/>
+              </a:srgbClr>
+            </a:solidFill>
+            <a:ln w="9000" cap="rnd">
+              <a:solidFill>
+                <a:srgbClr val="F8766D">
+                  <a:alpha val="100000"/>
+                </a:srgbClr>
+              </a:solidFill>
+              <a:prstDash val="solid"/>
+              <a:round/>
+            </a:ln>
+          </p:spPr>
+          <p:txBody>
+            <a:bodyPr/>
+            <a:lstStyle/>
+            <a:p/>
+          </p:txBody>
+        </p:sp>
+        <p:sp>
+          <p:nvSpPr>
+            <p:cNvPr id="88" name="pt87"/>
+            <p:cNvSpPr/>
+            <p:nvPr/>
+          </p:nvSpPr>
+          <p:spPr>
+            <a:xfrm>
+              <a:off x="4645833" y="3152611"/>
+              <a:ext cx="49651" cy="49651"/>
+            </a:xfrm>
+            <a:prstGeom prst="ellipse">
+              <a:avLst/>
+            </a:prstGeom>
+            <a:solidFill>
+              <a:srgbClr val="F8766D">
+                <a:alpha val="100000"/>
+              </a:srgbClr>
+            </a:solidFill>
+            <a:ln w="9000" cap="rnd">
+              <a:solidFill>
+                <a:srgbClr val="F8766D">
+                  <a:alpha val="100000"/>
+                </a:srgbClr>
+              </a:solidFill>
+              <a:prstDash val="solid"/>
+              <a:round/>
+            </a:ln>
+          </p:spPr>
+          <p:txBody>
+            <a:bodyPr/>
+            <a:lstStyle/>
+            <a:p/>
+          </p:txBody>
+        </p:sp>
+        <p:sp>
+          <p:nvSpPr>
+            <p:cNvPr id="89" name="pt88"/>
+            <p:cNvSpPr/>
+            <p:nvPr/>
+          </p:nvSpPr>
+          <p:spPr>
+            <a:xfrm>
+              <a:off x="4717566" y="2999062"/>
+              <a:ext cx="49651" cy="49651"/>
+            </a:xfrm>
+            <a:prstGeom prst="ellipse">
+              <a:avLst/>
+            </a:prstGeom>
+            <a:solidFill>
+              <a:srgbClr val="F8766D">
+                <a:alpha val="100000"/>
+              </a:srgbClr>
+            </a:solidFill>
+            <a:ln w="9000" cap="rnd">
+              <a:solidFill>
+                <a:srgbClr val="F8766D">
+                  <a:alpha val="100000"/>
+                </a:srgbClr>
+              </a:solidFill>
+              <a:prstDash val="solid"/>
+              <a:round/>
+            </a:ln>
+          </p:spPr>
+          <p:txBody>
+            <a:bodyPr/>
+            <a:lstStyle/>
+            <a:p/>
+          </p:txBody>
+        </p:sp>
+        <p:sp>
+          <p:nvSpPr>
+            <p:cNvPr id="90" name="pt89"/>
+            <p:cNvSpPr/>
+            <p:nvPr/>
+          </p:nvSpPr>
+          <p:spPr>
+            <a:xfrm>
+              <a:off x="4789299" y="2715986"/>
+              <a:ext cx="49651" cy="49651"/>
+            </a:xfrm>
+            <a:prstGeom prst="ellipse">
+              <a:avLst/>
+            </a:prstGeom>
+            <a:solidFill>
+              <a:srgbClr val="F8766D">
+                <a:alpha val="100000"/>
+              </a:srgbClr>
+            </a:solidFill>
+            <a:ln w="9000" cap="rnd">
+              <a:solidFill>
+                <a:srgbClr val="F8766D">
+                  <a:alpha val="100000"/>
+                </a:srgbClr>
+              </a:solidFill>
+              <a:prstDash val="solid"/>
+              <a:round/>
+            </a:ln>
+          </p:spPr>
+          <p:txBody>
+            <a:bodyPr/>
+            <a:lstStyle/>
+            <a:p/>
+          </p:txBody>
+        </p:sp>
+        <p:sp>
+          <p:nvSpPr>
+            <p:cNvPr id="91" name="pt90"/>
+            <p:cNvSpPr/>
+            <p:nvPr/>
+          </p:nvSpPr>
+          <p:spPr>
+            <a:xfrm>
+              <a:off x="4861031" y="2529361"/>
+              <a:ext cx="49651" cy="49651"/>
+            </a:xfrm>
+            <a:prstGeom prst="ellipse">
+              <a:avLst/>
+            </a:prstGeom>
+            <a:solidFill>
+              <a:srgbClr val="F8766D">
+                <a:alpha val="100000"/>
+              </a:srgbClr>
+            </a:solidFill>
+            <a:ln w="9000" cap="rnd">
+              <a:solidFill>
+                <a:srgbClr val="F8766D">
+                  <a:alpha val="100000"/>
+                </a:srgbClr>
+              </a:solidFill>
+              <a:prstDash val="solid"/>
+              <a:round/>
+            </a:ln>
+          </p:spPr>
+          <p:txBody>
+            <a:bodyPr/>
+            <a:lstStyle/>
+            <a:p/>
+          </p:txBody>
+        </p:sp>
+        <p:sp>
+          <p:nvSpPr>
+            <p:cNvPr id="92" name="pt91"/>
+            <p:cNvSpPr/>
+            <p:nvPr/>
+          </p:nvSpPr>
+          <p:spPr>
+            <a:xfrm>
+              <a:off x="4932764" y="2376485"/>
+              <a:ext cx="49651" cy="49651"/>
+            </a:xfrm>
+            <a:prstGeom prst="ellipse">
+              <a:avLst/>
+            </a:prstGeom>
+            <a:solidFill>
+              <a:srgbClr val="F8766D">
+                <a:alpha val="100000"/>
+              </a:srgbClr>
+            </a:solidFill>
+            <a:ln w="9000" cap="rnd">
+              <a:solidFill>
+                <a:srgbClr val="F8766D">
+                  <a:alpha val="100000"/>
+                </a:srgbClr>
+              </a:solidFill>
+              <a:prstDash val="solid"/>
+              <a:round/>
+            </a:ln>
+          </p:spPr>
+          <p:txBody>
+            <a:bodyPr/>
+            <a:lstStyle/>
+            <a:p/>
+          </p:txBody>
+        </p:sp>
+        <p:sp>
+          <p:nvSpPr>
+            <p:cNvPr id="93" name="pt92"/>
+            <p:cNvSpPr/>
+            <p:nvPr/>
+          </p:nvSpPr>
+          <p:spPr>
+            <a:xfrm>
+              <a:off x="5004497" y="2529550"/>
+              <a:ext cx="49651" cy="49651"/>
+            </a:xfrm>
+            <a:prstGeom prst="ellipse">
+              <a:avLst/>
+            </a:prstGeom>
+            <a:solidFill>
+              <a:srgbClr val="F8766D">
+                <a:alpha val="100000"/>
+              </a:srgbClr>
+            </a:solidFill>
+            <a:ln w="9000" cap="rnd">
+              <a:solidFill>
+                <a:srgbClr val="F8766D">
+                  <a:alpha val="100000"/>
+                </a:srgbClr>
+              </a:solidFill>
+              <a:prstDash val="solid"/>
+              <a:round/>
+            </a:ln>
+          </p:spPr>
+          <p:txBody>
+            <a:bodyPr/>
+            <a:lstStyle/>
+            <a:p/>
+          </p:txBody>
+        </p:sp>
+        <p:sp>
+          <p:nvSpPr>
+            <p:cNvPr id="94" name="pt93"/>
+            <p:cNvSpPr/>
+            <p:nvPr/>
+          </p:nvSpPr>
+          <p:spPr>
+            <a:xfrm>
+              <a:off x="5076230" y="2811125"/>
+              <a:ext cx="49651" cy="49651"/>
+            </a:xfrm>
+            <a:prstGeom prst="ellipse">
+              <a:avLst/>
+            </a:prstGeom>
+            <a:solidFill>
+              <a:srgbClr val="F8766D">
+                <a:alpha val="100000"/>
+              </a:srgbClr>
+            </a:solidFill>
+            <a:ln w="9000" cap="rnd">
+              <a:solidFill>
+                <a:srgbClr val="F8766D">
+                  <a:alpha val="100000"/>
+                </a:srgbClr>
+              </a:solidFill>
+              <a:prstDash val="solid"/>
+              <a:round/>
+            </a:ln>
+          </p:spPr>
+          <p:txBody>
+            <a:bodyPr/>
+            <a:lstStyle/>
+            <a:p/>
+          </p:txBody>
+        </p:sp>
+        <p:sp>
+          <p:nvSpPr>
+            <p:cNvPr id="95" name="pt94"/>
+            <p:cNvSpPr/>
+            <p:nvPr/>
+          </p:nvSpPr>
+          <p:spPr>
+            <a:xfrm>
+              <a:off x="5147963" y="3262713"/>
+              <a:ext cx="49651" cy="49651"/>
+            </a:xfrm>
+            <a:prstGeom prst="ellipse">
+              <a:avLst/>
+            </a:prstGeom>
+            <a:solidFill>
+              <a:srgbClr val="F8766D">
+                <a:alpha val="100000"/>
+              </a:srgbClr>
+            </a:solidFill>
+            <a:ln w="9000" cap="rnd">
+              <a:solidFill>
+                <a:srgbClr val="F8766D">
+                  <a:alpha val="100000"/>
+                </a:srgbClr>
+              </a:solidFill>
+              <a:prstDash val="solid"/>
+              <a:round/>
+            </a:ln>
+          </p:spPr>
+          <p:txBody>
+            <a:bodyPr/>
+            <a:lstStyle/>
+            <a:p/>
+          </p:txBody>
+        </p:sp>
+        <p:sp>
+          <p:nvSpPr>
+            <p:cNvPr id="96" name="pt95"/>
+            <p:cNvSpPr/>
+            <p:nvPr/>
+          </p:nvSpPr>
+          <p:spPr>
+            <a:xfrm>
+              <a:off x="5219696" y="3549302"/>
+              <a:ext cx="49651" cy="49651"/>
+            </a:xfrm>
+            <a:prstGeom prst="ellipse">
+              <a:avLst/>
+            </a:prstGeom>
+            <a:solidFill>
+              <a:srgbClr val="F8766D">
+                <a:alpha val="100000"/>
+              </a:srgbClr>
+            </a:solidFill>
+            <a:ln w="9000" cap="rnd">
+              <a:solidFill>
+                <a:srgbClr val="F8766D">
+                  <a:alpha val="100000"/>
+                </a:srgbClr>
+              </a:solidFill>
+              <a:prstDash val="solid"/>
+              <a:round/>
+            </a:ln>
+          </p:spPr>
+          <p:txBody>
+            <a:bodyPr/>
+            <a:lstStyle/>
+            <a:p/>
+          </p:txBody>
+        </p:sp>
+        <p:sp>
+          <p:nvSpPr>
+            <p:cNvPr id="97" name="pt96"/>
+            <p:cNvSpPr/>
+            <p:nvPr/>
+          </p:nvSpPr>
+          <p:spPr>
+            <a:xfrm>
+              <a:off x="5291429" y="3728122"/>
+              <a:ext cx="49651" cy="49651"/>
+            </a:xfrm>
+            <a:prstGeom prst="ellipse">
+              <a:avLst/>
+            </a:prstGeom>
+            <a:solidFill>
+              <a:srgbClr val="F8766D">
+                <a:alpha val="100000"/>
+              </a:srgbClr>
+            </a:solidFill>
+            <a:ln w="9000" cap="rnd">
+              <a:solidFill>
+                <a:srgbClr val="F8766D">
+                  <a:alpha val="100000"/>
+                </a:srgbClr>
+              </a:solidFill>
+              <a:prstDash val="solid"/>
+              <a:round/>
+            </a:ln>
+          </p:spPr>
+          <p:txBody>
+            <a:bodyPr/>
+            <a:lstStyle/>
+            <a:p/>
+          </p:txBody>
+        </p:sp>
+        <p:sp>
+          <p:nvSpPr>
+            <p:cNvPr id="98" name="pt97"/>
+            <p:cNvSpPr/>
+            <p:nvPr/>
+          </p:nvSpPr>
+          <p:spPr>
+            <a:xfrm>
+              <a:off x="5363162" y="3815461"/>
+              <a:ext cx="49651" cy="49651"/>
+            </a:xfrm>
+            <a:prstGeom prst="ellipse">
+              <a:avLst/>
+            </a:prstGeom>
+            <a:solidFill>
+              <a:srgbClr val="F8766D">
+                <a:alpha val="100000"/>
+              </a:srgbClr>
+            </a:solidFill>
+            <a:ln w="9000" cap="rnd">
+              <a:solidFill>
+                <a:srgbClr val="F8766D">
+                  <a:alpha val="100000"/>
+                </a:srgbClr>
+              </a:solidFill>
+              <a:prstDash val="solid"/>
+              <a:round/>
+            </a:ln>
+          </p:spPr>
+          <p:txBody>
+            <a:bodyPr/>
+            <a:lstStyle/>
+            <a:p/>
+          </p:txBody>
+        </p:sp>
+        <p:sp>
+          <p:nvSpPr>
+            <p:cNvPr id="99" name="pt98"/>
+            <p:cNvSpPr/>
+            <p:nvPr/>
+          </p:nvSpPr>
+          <p:spPr>
+            <a:xfrm>
+              <a:off x="5434895" y="3870301"/>
+              <a:ext cx="49651" cy="49651"/>
+            </a:xfrm>
+            <a:prstGeom prst="ellipse">
+              <a:avLst/>
+            </a:prstGeom>
+            <a:solidFill>
+              <a:srgbClr val="F8766D">
+                <a:alpha val="100000"/>
+              </a:srgbClr>
+            </a:solidFill>
+            <a:ln w="9000" cap="rnd">
+              <a:solidFill>
+                <a:srgbClr val="F8766D">
+                  <a:alpha val="100000"/>
+                </a:srgbClr>
+              </a:solidFill>
+              <a:prstDash val="solid"/>
+              <a:round/>
+            </a:ln>
+          </p:spPr>
+          <p:txBody>
+            <a:bodyPr/>
+            <a:lstStyle/>
+            <a:p/>
+          </p:txBody>
+        </p:sp>
+        <p:sp>
+          <p:nvSpPr>
+            <p:cNvPr id="100" name="tx99"/>
+            <p:cNvSpPr/>
+            <p:nvPr/>
+          </p:nvSpPr>
+          <p:spPr>
+            <a:xfrm>
+              <a:off x="1148183" y="3985462"/>
               <a:ext cx="217517" cy="81691"/>
             </a:xfrm>
             <a:prstGeom prst="rect">
@@ -4974,13 +6119,13 @@
         </p:sp>
         <p:sp>
           <p:nvSpPr>
-            <p:cNvPr id="71" name="tx70"/>
-            <p:cNvSpPr/>
-            <p:nvPr/>
-          </p:nvSpPr>
-          <p:spPr>
-            <a:xfrm>
-              <a:off x="1148183" y="3033698"/>
+            <p:cNvPr id="101" name="tx100"/>
+            <p:cNvSpPr/>
+            <p:nvPr/>
+          </p:nvSpPr>
+          <p:spPr>
+            <a:xfrm>
+              <a:off x="1148183" y="3138303"/>
               <a:ext cx="217517" cy="81691"/>
             </a:xfrm>
             <a:prstGeom prst="rect">
@@ -5020,13 +6165,13 @@
         </p:sp>
         <p:sp>
           <p:nvSpPr>
-            <p:cNvPr id="72" name="tx71"/>
-            <p:cNvSpPr/>
-            <p:nvPr/>
-          </p:nvSpPr>
-          <p:spPr>
-            <a:xfrm>
-              <a:off x="1148183" y="2066751"/>
+            <p:cNvPr id="102" name="tx101"/>
+            <p:cNvSpPr/>
+            <p:nvPr/>
+          </p:nvSpPr>
+          <p:spPr>
+            <a:xfrm>
+              <a:off x="1148183" y="2291145"/>
               <a:ext cx="217517" cy="81691"/>
             </a:xfrm>
             <a:prstGeom prst="rect">
@@ -5066,13 +6211,13 @@
         </p:sp>
         <p:sp>
           <p:nvSpPr>
-            <p:cNvPr id="73" name="tx72"/>
-            <p:cNvSpPr/>
-            <p:nvPr/>
-          </p:nvSpPr>
-          <p:spPr>
-            <a:xfrm>
-              <a:off x="1148183" y="1099750"/>
+            <p:cNvPr id="103" name="tx102"/>
+            <p:cNvSpPr/>
+            <p:nvPr/>
+          </p:nvSpPr>
+          <p:spPr>
+            <a:xfrm>
+              <a:off x="1148183" y="1443932"/>
               <a:ext cx="217517" cy="81746"/>
             </a:xfrm>
             <a:prstGeom prst="rect">
@@ -5112,13 +6257,13 @@
         </p:sp>
         <p:sp>
           <p:nvSpPr>
-            <p:cNvPr id="74" name="pl73"/>
-            <p:cNvSpPr/>
-            <p:nvPr/>
-          </p:nvSpPr>
-          <p:spPr>
-            <a:xfrm>
-              <a:off x="1393536" y="4042336"/>
+            <p:cNvPr id="104" name="pl103"/>
+            <p:cNvSpPr/>
+            <p:nvPr/>
+          </p:nvSpPr>
+          <p:spPr>
+            <a:xfrm>
+              <a:off x="1393536" y="4027153"/>
               <a:ext cx="34794" cy="0"/>
             </a:xfrm>
             <a:custGeom>
@@ -5152,13 +6297,13 @@
         </p:sp>
         <p:sp>
           <p:nvSpPr>
-            <p:cNvPr id="75" name="pl74"/>
-            <p:cNvSpPr/>
-            <p:nvPr/>
-          </p:nvSpPr>
-          <p:spPr>
-            <a:xfrm>
-              <a:off x="1393536" y="3075389"/>
+            <p:cNvPr id="105" name="pl104"/>
+            <p:cNvSpPr/>
+            <p:nvPr/>
+          </p:nvSpPr>
+          <p:spPr>
+            <a:xfrm>
+              <a:off x="1393536" y="3179995"/>
               <a:ext cx="34794" cy="0"/>
             </a:xfrm>
             <a:custGeom>
@@ -5192,13 +6337,13 @@
         </p:sp>
         <p:sp>
           <p:nvSpPr>
-            <p:cNvPr id="76" name="pl75"/>
-            <p:cNvSpPr/>
-            <p:nvPr/>
-          </p:nvSpPr>
-          <p:spPr>
-            <a:xfrm>
-              <a:off x="1393536" y="2108443"/>
+            <p:cNvPr id="106" name="pl105"/>
+            <p:cNvSpPr/>
+            <p:nvPr/>
+          </p:nvSpPr>
+          <p:spPr>
+            <a:xfrm>
+              <a:off x="1393536" y="2332837"/>
               <a:ext cx="34794" cy="0"/>
             </a:xfrm>
             <a:custGeom>
@@ -5232,13 +6377,13 @@
         </p:sp>
         <p:sp>
           <p:nvSpPr>
-            <p:cNvPr id="77" name="pl76"/>
-            <p:cNvSpPr/>
-            <p:nvPr/>
-          </p:nvSpPr>
-          <p:spPr>
-            <a:xfrm>
-              <a:off x="1393536" y="1141497"/>
+            <p:cNvPr id="107" name="pl106"/>
+            <p:cNvSpPr/>
+            <p:nvPr/>
+          </p:nvSpPr>
+          <p:spPr>
+            <a:xfrm>
+              <a:off x="1393536" y="1485678"/>
               <a:ext cx="34794" cy="0"/>
             </a:xfrm>
             <a:custGeom>
@@ -5272,7 +6417,7 @@
         </p:sp>
         <p:sp>
           <p:nvSpPr>
-            <p:cNvPr id="78" name="pl77"/>
+            <p:cNvPr id="108" name="pl107"/>
             <p:cNvSpPr/>
             <p:nvPr/>
           </p:nvSpPr>
@@ -5312,7 +6457,7 @@
         </p:sp>
         <p:sp>
           <p:nvSpPr>
-            <p:cNvPr id="79" name="pl78"/>
+            <p:cNvPr id="109" name="pl108"/>
             <p:cNvSpPr/>
             <p:nvPr/>
           </p:nvSpPr>
@@ -5352,7 +6497,7 @@
         </p:sp>
         <p:sp>
           <p:nvSpPr>
-            <p:cNvPr id="80" name="pl79"/>
+            <p:cNvPr id="110" name="pl109"/>
             <p:cNvSpPr/>
             <p:nvPr/>
           </p:nvSpPr>
@@ -5392,7 +6537,7 @@
         </p:sp>
         <p:sp>
           <p:nvSpPr>
-            <p:cNvPr id="81" name="pl80"/>
+            <p:cNvPr id="111" name="pl110"/>
             <p:cNvSpPr/>
             <p:nvPr/>
           </p:nvSpPr>
@@ -5432,7 +6577,7 @@
         </p:sp>
         <p:sp>
           <p:nvSpPr>
-            <p:cNvPr id="82" name="pl81"/>
+            <p:cNvPr id="112" name="pl111"/>
             <p:cNvSpPr/>
             <p:nvPr/>
           </p:nvSpPr>
@@ -5472,7 +6617,7 @@
         </p:sp>
         <p:sp>
           <p:nvSpPr>
-            <p:cNvPr id="83" name="pl82"/>
+            <p:cNvPr id="113" name="pl112"/>
             <p:cNvSpPr/>
             <p:nvPr/>
           </p:nvSpPr>
@@ -5512,7 +6657,7 @@
         </p:sp>
         <p:sp>
           <p:nvSpPr>
-            <p:cNvPr id="84" name="pl83"/>
+            <p:cNvPr id="114" name="pl113"/>
             <p:cNvSpPr/>
             <p:nvPr/>
           </p:nvSpPr>
@@ -5552,7 +6697,7 @@
         </p:sp>
         <p:sp>
           <p:nvSpPr>
-            <p:cNvPr id="85" name="pl84"/>
+            <p:cNvPr id="115" name="pl114"/>
             <p:cNvSpPr/>
             <p:nvPr/>
           </p:nvSpPr>
@@ -5592,7 +6737,7 @@
         </p:sp>
         <p:sp>
           <p:nvSpPr>
-            <p:cNvPr id="86" name="pl85"/>
+            <p:cNvPr id="116" name="pl115"/>
             <p:cNvSpPr/>
             <p:nvPr/>
           </p:nvSpPr>
@@ -5632,7 +6777,7 @@
         </p:sp>
         <p:sp>
           <p:nvSpPr>
-            <p:cNvPr id="87" name="pl86"/>
+            <p:cNvPr id="117" name="pl116"/>
             <p:cNvSpPr/>
             <p:nvPr/>
           </p:nvSpPr>
@@ -5672,7 +6817,7 @@
         </p:sp>
         <p:sp>
           <p:nvSpPr>
-            <p:cNvPr id="88" name="pl87"/>
+            <p:cNvPr id="118" name="pl117"/>
             <p:cNvSpPr/>
             <p:nvPr/>
           </p:nvSpPr>
@@ -5712,7 +6857,7 @@
         </p:sp>
         <p:sp>
           <p:nvSpPr>
-            <p:cNvPr id="89" name="pl88"/>
+            <p:cNvPr id="119" name="pl118"/>
             <p:cNvSpPr/>
             <p:nvPr/>
           </p:nvSpPr>
@@ -5752,7 +6897,7 @@
         </p:sp>
         <p:sp>
           <p:nvSpPr>
-            <p:cNvPr id="90" name="pl89"/>
+            <p:cNvPr id="120" name="pl119"/>
             <p:cNvSpPr/>
             <p:nvPr/>
           </p:nvSpPr>
@@ -5792,7 +6937,7 @@
         </p:sp>
         <p:sp>
           <p:nvSpPr>
-            <p:cNvPr id="91" name="pl90"/>
+            <p:cNvPr id="121" name="pl120"/>
             <p:cNvSpPr/>
             <p:nvPr/>
           </p:nvSpPr>
@@ -5832,7 +6977,7 @@
         </p:sp>
         <p:sp>
           <p:nvSpPr>
-            <p:cNvPr id="92" name="tx91"/>
+            <p:cNvPr id="122" name="tx121"/>
             <p:cNvSpPr/>
             <p:nvPr/>
           </p:nvSpPr>
@@ -5878,7 +7023,7 @@
         </p:sp>
         <p:sp>
           <p:nvSpPr>
-            <p:cNvPr id="93" name="tx92"/>
+            <p:cNvPr id="123" name="tx122"/>
             <p:cNvSpPr/>
             <p:nvPr/>
           </p:nvSpPr>
@@ -5924,7 +7069,7 @@
         </p:sp>
         <p:sp>
           <p:nvSpPr>
-            <p:cNvPr id="94" name="tx93"/>
+            <p:cNvPr id="124" name="tx123"/>
             <p:cNvSpPr/>
             <p:nvPr/>
           </p:nvSpPr>
@@ -5970,7 +7115,7 @@
         </p:sp>
         <p:sp>
           <p:nvSpPr>
-            <p:cNvPr id="95" name="tx94"/>
+            <p:cNvPr id="125" name="tx124"/>
             <p:cNvSpPr/>
             <p:nvPr/>
           </p:nvSpPr>
@@ -6016,7 +7161,7 @@
         </p:sp>
         <p:sp>
           <p:nvSpPr>
-            <p:cNvPr id="96" name="tx95"/>
+            <p:cNvPr id="126" name="tx125"/>
             <p:cNvSpPr/>
             <p:nvPr/>
           </p:nvSpPr>
@@ -6062,7 +7207,7 @@
         </p:sp>
         <p:sp>
           <p:nvSpPr>
-            <p:cNvPr id="97" name="tx96"/>
+            <p:cNvPr id="127" name="tx126"/>
             <p:cNvSpPr/>
             <p:nvPr/>
           </p:nvSpPr>
@@ -6108,7 +7253,7 @@
         </p:sp>
         <p:sp>
           <p:nvSpPr>
-            <p:cNvPr id="98" name="tx97"/>
+            <p:cNvPr id="128" name="tx127"/>
             <p:cNvSpPr/>
             <p:nvPr/>
           </p:nvSpPr>
@@ -6154,7 +7299,7 @@
         </p:sp>
         <p:sp>
           <p:nvSpPr>
-            <p:cNvPr id="99" name="tx98"/>
+            <p:cNvPr id="129" name="tx128"/>
             <p:cNvSpPr/>
             <p:nvPr/>
           </p:nvSpPr>
@@ -6200,7 +7345,7 @@
         </p:sp>
         <p:sp>
           <p:nvSpPr>
-            <p:cNvPr id="100" name="tx99"/>
+            <p:cNvPr id="130" name="tx129"/>
             <p:cNvSpPr/>
             <p:nvPr/>
           </p:nvSpPr>
@@ -6246,7 +7391,7 @@
         </p:sp>
         <p:sp>
           <p:nvSpPr>
-            <p:cNvPr id="101" name="tx100"/>
+            <p:cNvPr id="131" name="tx130"/>
             <p:cNvSpPr/>
             <p:nvPr/>
           </p:nvSpPr>
@@ -6292,7 +7437,7 @@
         </p:sp>
         <p:sp>
           <p:nvSpPr>
-            <p:cNvPr id="102" name="tx101"/>
+            <p:cNvPr id="132" name="tx131"/>
             <p:cNvSpPr/>
             <p:nvPr/>
           </p:nvSpPr>
@@ -6338,7 +7483,7 @@
         </p:sp>
         <p:sp>
           <p:nvSpPr>
-            <p:cNvPr id="103" name="tx102"/>
+            <p:cNvPr id="133" name="tx132"/>
             <p:cNvSpPr/>
             <p:nvPr/>
           </p:nvSpPr>
@@ -6384,7 +7529,7 @@
         </p:sp>
         <p:sp>
           <p:nvSpPr>
-            <p:cNvPr id="104" name="tx103"/>
+            <p:cNvPr id="134" name="tx133"/>
             <p:cNvSpPr/>
             <p:nvPr/>
           </p:nvSpPr>
@@ -6430,7 +7575,7 @@
         </p:sp>
         <p:sp>
           <p:nvSpPr>
-            <p:cNvPr id="105" name="tx104"/>
+            <p:cNvPr id="135" name="tx134"/>
             <p:cNvSpPr/>
             <p:nvPr/>
           </p:nvSpPr>
@@ -6476,7 +7621,7 @@
         </p:sp>
         <p:sp>
           <p:nvSpPr>
-            <p:cNvPr id="106" name="tx105"/>
+            <p:cNvPr id="136" name="tx135"/>
             <p:cNvSpPr/>
             <p:nvPr/>
           </p:nvSpPr>
@@ -6522,7 +7667,7 @@
         </p:sp>
         <p:sp>
           <p:nvSpPr>
-            <p:cNvPr id="107" name="tx106"/>
+            <p:cNvPr id="137" name="tx136"/>
             <p:cNvSpPr/>
             <p:nvPr/>
           </p:nvSpPr>
@@ -6568,7 +7713,7 @@
         </p:sp>
         <p:sp>
           <p:nvSpPr>
-            <p:cNvPr id="108" name="rc107"/>
+            <p:cNvPr id="138" name="rc137"/>
             <p:cNvSpPr/>
             <p:nvPr/>
           </p:nvSpPr>
@@ -6594,7 +7739,7 @@
         </p:sp>
         <p:sp>
           <p:nvSpPr>
-            <p:cNvPr id="109" name="tx108"/>
+            <p:cNvPr id="139" name="tx138"/>
             <p:cNvSpPr/>
             <p:nvPr/>
           </p:nvSpPr>
@@ -6640,7 +7785,7 @@
         </p:sp>
         <p:sp>
           <p:nvSpPr>
-            <p:cNvPr id="110" name="rc109"/>
+            <p:cNvPr id="140" name="rc139"/>
             <p:cNvSpPr/>
             <p:nvPr/>
           </p:nvSpPr>
@@ -6666,7 +7811,7 @@
         </p:sp>
         <p:sp>
           <p:nvSpPr>
-            <p:cNvPr id="111" name="pl110"/>
+            <p:cNvPr id="141" name="pl140"/>
             <p:cNvSpPr/>
             <p:nvPr/>
           </p:nvSpPr>
@@ -6706,7 +7851,7 @@
         </p:sp>
         <p:sp>
           <p:nvSpPr>
-            <p:cNvPr id="112" name="pt111"/>
+            <p:cNvPr id="142" name="pt141"/>
             <p:cNvSpPr/>
             <p:nvPr/>
           </p:nvSpPr>
@@ -6741,7 +7886,7 @@
         </p:sp>
         <p:sp>
           <p:nvSpPr>
-            <p:cNvPr id="113" name="tx112"/>
+            <p:cNvPr id="143" name="tx142"/>
             <p:cNvSpPr/>
             <p:nvPr/>
           </p:nvSpPr>

</xml_diff>